<commit_message>
:art: update slide for BBL
</commit_message>
<xml_diff>
--- a/introduction-graphql.pptx
+++ b/introduction-graphql.pptx
@@ -259,7 +259,7 @@
           <a:p>
             <a:fld id="{3D06E3AD-E22D-7B49-A93F-0C611B02B1F3}" type="datetimeFigureOut">
               <a:rPr lang="en-US" smtClean="0"/>
-              <a:t>4/28/16</a:t>
+              <a:t>10/25/16</a:t>
             </a:fld>
             <a:endParaRPr lang="en-US"/>
           </a:p>
@@ -436,7 +436,7 @@
           <a:p>
             <a:fld id="{3D06E3AD-E22D-7B49-A93F-0C611B02B1F3}" type="datetimeFigureOut">
               <a:rPr lang="en-US" smtClean="0"/>
-              <a:t>4/28/16</a:t>
+              <a:t>10/25/16</a:t>
             </a:fld>
             <a:endParaRPr lang="en-US"/>
           </a:p>
@@ -616,7 +616,7 @@
           <a:p>
             <a:fld id="{3D06E3AD-E22D-7B49-A93F-0C611B02B1F3}" type="datetimeFigureOut">
               <a:rPr lang="en-US" smtClean="0"/>
-              <a:t>4/28/16</a:t>
+              <a:t>10/25/16</a:t>
             </a:fld>
             <a:endParaRPr lang="en-US"/>
           </a:p>
@@ -810,7 +810,7 @@
           <a:p>
             <a:fld id="{3D06E3AD-E22D-7B49-A93F-0C611B02B1F3}" type="datetimeFigureOut">
               <a:rPr lang="en-US" smtClean="0"/>
-              <a:t>4/28/16</a:t>
+              <a:t>10/25/16</a:t>
             </a:fld>
             <a:endParaRPr lang="en-US"/>
           </a:p>
@@ -1063,7 +1063,7 @@
           <a:p>
             <a:fld id="{3D06E3AD-E22D-7B49-A93F-0C611B02B1F3}" type="datetimeFigureOut">
               <a:rPr lang="en-US" smtClean="0"/>
-              <a:t>4/28/16</a:t>
+              <a:t>10/25/16</a:t>
             </a:fld>
             <a:endParaRPr lang="en-US"/>
           </a:p>
@@ -1295,7 +1295,7 @@
           <a:p>
             <a:fld id="{3D06E3AD-E22D-7B49-A93F-0C611B02B1F3}" type="datetimeFigureOut">
               <a:rPr lang="en-US" smtClean="0"/>
-              <a:t>4/28/16</a:t>
+              <a:t>10/25/16</a:t>
             </a:fld>
             <a:endParaRPr lang="en-US"/>
           </a:p>
@@ -1662,7 +1662,7 @@
           <a:p>
             <a:fld id="{3D06E3AD-E22D-7B49-A93F-0C611B02B1F3}" type="datetimeFigureOut">
               <a:rPr lang="en-US" smtClean="0"/>
-              <a:t>4/28/16</a:t>
+              <a:t>10/25/16</a:t>
             </a:fld>
             <a:endParaRPr lang="en-US"/>
           </a:p>
@@ -1787,7 +1787,7 @@
           <a:p>
             <a:fld id="{3D06E3AD-E22D-7B49-A93F-0C611B02B1F3}" type="datetimeFigureOut">
               <a:rPr lang="en-US" smtClean="0"/>
-              <a:t>4/28/16</a:t>
+              <a:t>10/25/16</a:t>
             </a:fld>
             <a:endParaRPr lang="en-US"/>
           </a:p>
@@ -1889,7 +1889,7 @@
           <a:p>
             <a:fld id="{3D06E3AD-E22D-7B49-A93F-0C611B02B1F3}" type="datetimeFigureOut">
               <a:rPr lang="en-US" smtClean="0"/>
-              <a:t>4/28/16</a:t>
+              <a:t>10/25/16</a:t>
             </a:fld>
             <a:endParaRPr lang="en-US"/>
           </a:p>
@@ -2166,7 +2166,7 @@
           <a:p>
             <a:fld id="{3D06E3AD-E22D-7B49-A93F-0C611B02B1F3}" type="datetimeFigureOut">
               <a:rPr lang="en-US" smtClean="0"/>
-              <a:t>4/28/16</a:t>
+              <a:t>10/25/16</a:t>
             </a:fld>
             <a:endParaRPr lang="en-US"/>
           </a:p>
@@ -2419,7 +2419,7 @@
           <a:p>
             <a:fld id="{3D06E3AD-E22D-7B49-A93F-0C611B02B1F3}" type="datetimeFigureOut">
               <a:rPr lang="en-US" smtClean="0"/>
-              <a:t>4/28/16</a:t>
+              <a:t>10/25/16</a:t>
             </a:fld>
             <a:endParaRPr lang="en-US"/>
           </a:p>
@@ -2651,7 +2651,7 @@
           <a:p>
             <a:fld id="{3D06E3AD-E22D-7B49-A93F-0C611B02B1F3}" type="datetimeFigureOut">
               <a:rPr lang="en-US" smtClean="0"/>
-              <a:t>4/28/16</a:t>
+              <a:t>10/25/16</a:t>
             </a:fld>
             <a:endParaRPr lang="en-US"/>
           </a:p>
@@ -4206,7 +4206,7 @@
 </file>
 
 <file path=ppt/slides/slide13.xml><?xml version="1.0" encoding="utf-8"?>
-<p:sld xmlns:a="http://schemas.openxmlformats.org/drawingml/2006/main" xmlns:r="http://schemas.openxmlformats.org/officeDocument/2006/relationships" xmlns:p="http://schemas.openxmlformats.org/presentationml/2006/main">
+<p:sld xmlns:a="http://schemas.openxmlformats.org/drawingml/2006/main" xmlns:r="http://schemas.openxmlformats.org/officeDocument/2006/relationships" xmlns:p="http://schemas.openxmlformats.org/presentationml/2006/main" show="0">
   <p:cSld>
     <p:spTree>
       <p:nvGrpSpPr>
@@ -4489,6 +4489,14 @@
   <p:clrMapOvr>
     <a:masterClrMapping/>
   </p:clrMapOvr>
+  <mc:AlternateContent xmlns:mc="http://schemas.openxmlformats.org/markup-compatibility/2006">
+    <mc:Choice xmlns:p14="http://schemas.microsoft.com/office/powerpoint/2010/main" Requires="p14">
+      <p:transition spd="slow" p14:dur="2000"/>
+    </mc:Choice>
+    <mc:Fallback>
+      <p:transition spd="slow"/>
+    </mc:Fallback>
+  </mc:AlternateContent>
   <p:timing>
     <p:tnLst>
       <p:par>
@@ -4709,7 +4717,18 @@
                 </a:solidFill>
                 <a:sym typeface="Wingdings"/>
               </a:rPr>
-              <a:t> de pair </a:t>
+              <a:t> de </a:t>
+            </a:r>
+            <a:r>
+              <a:rPr lang="en-US" sz="2400" i="1" dirty="0" smtClean="0">
+                <a:solidFill>
+                  <a:schemeClr val="tx1">
+                    <a:lumMod val="75000"/>
+                  </a:schemeClr>
+                </a:solidFill>
+                <a:sym typeface="Wingdings"/>
+              </a:rPr>
+              <a:t>pair avec </a:t>
             </a:r>
             <a:r>
               <a:rPr lang="en-US" sz="2400" i="1" dirty="0" err="1" smtClean="0">
@@ -5574,7 +5593,7 @@
           <a:p>
             <a:pPr algn="ctr"/>
             <a:r>
-              <a:rPr lang="en-US" sz="2400" b="1" dirty="0" smtClean="0">
+              <a:rPr lang="en-US" sz="2400" b="1" dirty="0">
                 <a:solidFill>
                   <a:srgbClr val="00B0F0"/>
                 </a:solidFill>
@@ -5582,7 +5601,62 @@
                 <a:ea typeface="Open Sans Semibold" charset="0"/>
                 <a:cs typeface="Open Sans Semibold" charset="0"/>
               </a:rPr>
-              <a:t>Software Engineer Senior @Dailymotion</a:t>
+              <a:t>Senior </a:t>
+            </a:r>
+            <a:r>
+              <a:rPr lang="en-US" sz="2400" b="1" dirty="0" smtClean="0">
+                <a:solidFill>
+                  <a:srgbClr val="00B0F0"/>
+                </a:solidFill>
+                <a:latin typeface="Open Sans Semibold" charset="0"/>
+                <a:ea typeface="Open Sans Semibold" charset="0"/>
+                <a:cs typeface="Open Sans Semibold" charset="0"/>
+              </a:rPr>
+              <a:t>Scale </a:t>
+            </a:r>
+            <a:r>
+              <a:rPr lang="en-US" sz="2400" b="1" dirty="0">
+                <a:solidFill>
+                  <a:srgbClr val="00B0F0"/>
+                </a:solidFill>
+                <a:latin typeface="Open Sans Semibold" charset="0"/>
+                <a:ea typeface="Open Sans Semibold" charset="0"/>
+                <a:cs typeface="Open Sans Semibold" charset="0"/>
+              </a:rPr>
+              <a:t>Software </a:t>
+            </a:r>
+            <a:r>
+              <a:rPr lang="en-US" sz="2400" b="1" dirty="0" smtClean="0">
+                <a:solidFill>
+                  <a:srgbClr val="00B0F0"/>
+                </a:solidFill>
+                <a:latin typeface="Open Sans Semibold" charset="0"/>
+                <a:ea typeface="Open Sans Semibold" charset="0"/>
+                <a:cs typeface="Open Sans Semibold" charset="0"/>
+              </a:rPr>
+              <a:t>Engineer </a:t>
+            </a:r>
+            <a:r>
+              <a:rPr lang="en-US" sz="2400" b="1" dirty="0" smtClean="0">
+                <a:solidFill>
+                  <a:srgbClr val="00B0F0"/>
+                </a:solidFill>
+                <a:latin typeface="Open Sans Semibold" charset="0"/>
+                <a:ea typeface="Open Sans Semibold" charset="0"/>
+                <a:cs typeface="Open Sans Semibold" charset="0"/>
+              </a:rPr>
+              <a:t>@</a:t>
+            </a:r>
+            <a:r>
+              <a:rPr lang="en-US" sz="2400" b="1" dirty="0" smtClean="0">
+                <a:solidFill>
+                  <a:srgbClr val="00B0F0"/>
+                </a:solidFill>
+                <a:latin typeface="Open Sans Semibold" charset="0"/>
+                <a:ea typeface="Open Sans Semibold" charset="0"/>
+                <a:cs typeface="Open Sans Semibold" charset="0"/>
+              </a:rPr>
+              <a:t>Dailymotion</a:t>
             </a:r>
           </a:p>
           <a:p>
@@ -6721,31 +6795,26 @@
               <a:buChar char="•"/>
             </a:pPr>
             <a:r>
-              <a:rPr lang="en-US" sz="2800" dirty="0" err="1" smtClean="0">
-                <a:latin typeface="Open Sans" charset="0"/>
-                <a:ea typeface="Open Sans" charset="0"/>
-                <a:cs typeface="Open Sans" charset="0"/>
-              </a:rPr>
-              <a:t>Toujours</a:t>
-            </a:r>
-            <a:r>
-              <a:rPr lang="en-US" sz="2800" dirty="0" smtClean="0">
-                <a:latin typeface="Open Sans" charset="0"/>
-                <a:ea typeface="Open Sans" charset="0"/>
-                <a:cs typeface="Open Sans" charset="0"/>
-              </a:rPr>
-              <a:t> avec le </a:t>
-            </a:r>
-            <a:r>
-              <a:rPr lang="en-US" sz="2800" dirty="0" err="1" smtClean="0">
-                <a:latin typeface="Open Sans" charset="0"/>
-                <a:ea typeface="Open Sans" charset="0"/>
-                <a:cs typeface="Open Sans" charset="0"/>
-              </a:rPr>
-              <a:t>statut</a:t>
-            </a:r>
-            <a:r>
-              <a:rPr lang="en-US" sz="2800" dirty="0" smtClean="0">
+              <a:rPr lang="en-US" sz="2800" b="1" dirty="0" smtClean="0">
+                <a:solidFill>
+                  <a:srgbClr val="DB7AC3"/>
+                </a:solidFill>
+                <a:latin typeface="Open Sans" charset="0"/>
+                <a:ea typeface="Open Sans" charset="0"/>
+                <a:cs typeface="Open Sans" charset="0"/>
+              </a:rPr>
+              <a:t>Production ready </a:t>
+            </a:r>
+            <a:r>
+              <a:rPr lang="en-US" sz="2800" i="1" dirty="0" err="1" smtClean="0">
+                <a:latin typeface="Open Sans" charset="0"/>
+                <a:ea typeface="Open Sans" charset="0"/>
+                <a:cs typeface="Open Sans" charset="0"/>
+              </a:rPr>
+              <a:t>depuis</a:t>
+            </a:r>
+            <a:r>
+              <a:rPr lang="en-US" sz="2800" i="1" dirty="0" smtClean="0">
                 <a:latin typeface="Open Sans" charset="0"/>
                 <a:ea typeface="Open Sans" charset="0"/>
                 <a:cs typeface="Open Sans" charset="0"/>
@@ -6753,26 +6822,12 @@
               <a:t> </a:t>
             </a:r>
             <a:r>
-              <a:rPr lang="en-US" sz="2800" b="1" dirty="0" smtClean="0">
-                <a:solidFill>
-                  <a:srgbClr val="DB7AC3"/>
-                </a:solidFill>
-                <a:latin typeface="Open Sans" charset="0"/>
-                <a:ea typeface="Open Sans" charset="0"/>
-                <a:cs typeface="Open Sans" charset="0"/>
-              </a:rPr>
-              <a:t>draft</a:t>
-            </a:r>
-            <a:r>
-              <a:rPr lang="en-US" sz="2800" dirty="0" smtClean="0">
-                <a:solidFill>
-                  <a:srgbClr val="DB7AC3"/>
-                </a:solidFill>
-                <a:latin typeface="Open Sans" charset="0"/>
-                <a:ea typeface="Open Sans" charset="0"/>
-                <a:cs typeface="Open Sans" charset="0"/>
-              </a:rPr>
-              <a:t> </a:t>
+              <a:rPr lang="en-US" sz="2800" i="1" dirty="0" err="1" smtClean="0">
+                <a:latin typeface="Open Sans" charset="0"/>
+                <a:ea typeface="Open Sans" charset="0"/>
+                <a:cs typeface="Open Sans" charset="0"/>
+              </a:rPr>
+              <a:t>septembre</a:t>
             </a:r>
             <a:r>
               <a:rPr lang="en-US" sz="2800" i="1" dirty="0" smtClean="0">
@@ -6780,172 +6835,13 @@
                 <a:ea typeface="Open Sans" charset="0"/>
                 <a:cs typeface="Open Sans" charset="0"/>
               </a:rPr>
-              <a:t>(</a:t>
-            </a:r>
-            <a:r>
-              <a:rPr lang="en-US" sz="2800" i="1" dirty="0" err="1" smtClean="0">
-                <a:latin typeface="Open Sans" charset="0"/>
-                <a:ea typeface="Open Sans" charset="0"/>
-                <a:cs typeface="Open Sans" charset="0"/>
-              </a:rPr>
-              <a:t>Octobre</a:t>
-            </a:r>
-            <a:r>
-              <a:rPr lang="en-US" sz="2800" i="1" dirty="0" smtClean="0">
-                <a:latin typeface="Open Sans" charset="0"/>
-                <a:ea typeface="Open Sans" charset="0"/>
-                <a:cs typeface="Open Sans" charset="0"/>
-              </a:rPr>
-              <a:t> 2015)</a:t>
+              <a:t> 2016</a:t>
             </a:r>
             <a:endParaRPr lang="fr-FR" sz="2800" i="1" dirty="0" smtClean="0">
               <a:latin typeface="Open Sans" charset="0"/>
               <a:ea typeface="Open Sans" charset="0"/>
               <a:cs typeface="Open Sans" charset="0"/>
             </a:endParaRPr>
-          </a:p>
-          <a:p>
-            <a:pPr marL="457200" indent="-457200">
-              <a:buFont typeface="Arial" charset="0"/>
-              <a:buChar char="•"/>
-            </a:pPr>
-            <a:endParaRPr lang="en-US" sz="2800" dirty="0" smtClean="0">
-              <a:latin typeface="Open Sans" charset="0"/>
-              <a:ea typeface="Open Sans" charset="0"/>
-              <a:cs typeface="Open Sans" charset="0"/>
-            </a:endParaRPr>
-          </a:p>
-          <a:p>
-            <a:pPr marL="457200" indent="-457200">
-              <a:buFont typeface="Arial" charset="0"/>
-              <a:buChar char="•"/>
-            </a:pPr>
-            <a:r>
-              <a:rPr lang="en-US" sz="2800" dirty="0" smtClean="0">
-                <a:latin typeface="Open Sans" charset="0"/>
-                <a:ea typeface="Open Sans" charset="0"/>
-                <a:cs typeface="Open Sans" charset="0"/>
-              </a:rPr>
-              <a:t>Pas de </a:t>
-            </a:r>
-            <a:r>
-              <a:rPr lang="en-US" sz="2800" b="1" dirty="0" smtClean="0">
-                <a:solidFill>
-                  <a:srgbClr val="DB7AC3"/>
-                </a:solidFill>
-                <a:latin typeface="Open Sans" charset="0"/>
-                <a:ea typeface="Open Sans" charset="0"/>
-                <a:cs typeface="Open Sans" charset="0"/>
-              </a:rPr>
-              <a:t>roadmap</a:t>
-            </a:r>
-            <a:r>
-              <a:rPr lang="en-US" sz="2800" dirty="0" smtClean="0">
-                <a:solidFill>
-                  <a:srgbClr val="DB7AC3"/>
-                </a:solidFill>
-                <a:latin typeface="Open Sans" charset="0"/>
-                <a:ea typeface="Open Sans" charset="0"/>
-                <a:cs typeface="Open Sans" charset="0"/>
-              </a:rPr>
-              <a:t> </a:t>
-            </a:r>
-            <a:r>
-              <a:rPr lang="en-US" sz="2800" dirty="0" err="1" smtClean="0">
-                <a:latin typeface="Open Sans" charset="0"/>
-                <a:ea typeface="Open Sans" charset="0"/>
-                <a:cs typeface="Open Sans" charset="0"/>
-              </a:rPr>
-              <a:t>connu</a:t>
-            </a:r>
-            <a:r>
-              <a:rPr lang="en-US" sz="2800" dirty="0" smtClean="0">
-                <a:latin typeface="Open Sans" charset="0"/>
-                <a:ea typeface="Open Sans" charset="0"/>
-                <a:cs typeface="Open Sans" charset="0"/>
-              </a:rPr>
-              <a:t>, </a:t>
-            </a:r>
-            <a:r>
-              <a:rPr lang="en-US" sz="2800" dirty="0" err="1" smtClean="0">
-                <a:latin typeface="Open Sans" charset="0"/>
-                <a:ea typeface="Open Sans" charset="0"/>
-                <a:cs typeface="Open Sans" charset="0"/>
-              </a:rPr>
-              <a:t>ça</a:t>
-            </a:r>
-            <a:r>
-              <a:rPr lang="en-US" sz="2800" dirty="0" smtClean="0">
-                <a:latin typeface="Open Sans" charset="0"/>
-                <a:ea typeface="Open Sans" charset="0"/>
-                <a:cs typeface="Open Sans" charset="0"/>
-              </a:rPr>
-              <a:t> </a:t>
-            </a:r>
-            <a:r>
-              <a:rPr lang="en-US" sz="2800" dirty="0" err="1" smtClean="0">
-                <a:latin typeface="Open Sans" charset="0"/>
-                <a:ea typeface="Open Sans" charset="0"/>
-                <a:cs typeface="Open Sans" charset="0"/>
-              </a:rPr>
-              <a:t>arrivera</a:t>
-            </a:r>
-            <a:r>
-              <a:rPr lang="en-US" sz="2800" dirty="0" smtClean="0">
-                <a:latin typeface="Open Sans" charset="0"/>
-                <a:ea typeface="Open Sans" charset="0"/>
-                <a:cs typeface="Open Sans" charset="0"/>
-              </a:rPr>
-              <a:t> </a:t>
-            </a:r>
-            <a:r>
-              <a:rPr lang="en-US" sz="2800" dirty="0" err="1" smtClean="0">
-                <a:latin typeface="Open Sans" charset="0"/>
-                <a:ea typeface="Open Sans" charset="0"/>
-                <a:cs typeface="Open Sans" charset="0"/>
-              </a:rPr>
-              <a:t>quand</a:t>
-            </a:r>
-            <a:r>
-              <a:rPr lang="en-US" sz="2800" dirty="0" smtClean="0">
-                <a:latin typeface="Open Sans" charset="0"/>
-                <a:ea typeface="Open Sans" charset="0"/>
-                <a:cs typeface="Open Sans" charset="0"/>
-              </a:rPr>
-              <a:t> </a:t>
-            </a:r>
-            <a:r>
-              <a:rPr lang="en-US" sz="2800" dirty="0" err="1" smtClean="0">
-                <a:latin typeface="Open Sans" charset="0"/>
-                <a:ea typeface="Open Sans" charset="0"/>
-                <a:cs typeface="Open Sans" charset="0"/>
-              </a:rPr>
-              <a:t>ça</a:t>
-            </a:r>
-            <a:r>
-              <a:rPr lang="en-US" sz="2800" dirty="0" smtClean="0">
-                <a:latin typeface="Open Sans" charset="0"/>
-                <a:ea typeface="Open Sans" charset="0"/>
-                <a:cs typeface="Open Sans" charset="0"/>
-              </a:rPr>
-              <a:t> </a:t>
-            </a:r>
-            <a:r>
-              <a:rPr lang="en-US" sz="2800" dirty="0" err="1" smtClean="0">
-                <a:latin typeface="Open Sans" charset="0"/>
-                <a:ea typeface="Open Sans" charset="0"/>
-                <a:cs typeface="Open Sans" charset="0"/>
-              </a:rPr>
-              <a:t>arrivera</a:t>
-            </a:r>
-            <a:r>
-              <a:rPr lang="en-US" sz="2800" dirty="0" smtClean="0">
-                <a:latin typeface="Open Sans" charset="0"/>
-                <a:ea typeface="Open Sans" charset="0"/>
-                <a:cs typeface="Open Sans" charset="0"/>
-              </a:rPr>
-              <a:t> !</a:t>
-            </a:r>
           </a:p>
           <a:p>
             <a:pPr marL="457200" indent="-457200">
@@ -12629,7 +12525,7 @@
 </file>
 
 <file path=ppt/slides/slide9.xml><?xml version="1.0" encoding="utf-8"?>
-<p:sld xmlns:a="http://schemas.openxmlformats.org/drawingml/2006/main" xmlns:r="http://schemas.openxmlformats.org/officeDocument/2006/relationships" xmlns:p="http://schemas.openxmlformats.org/presentationml/2006/main">
+<p:sld xmlns:a="http://schemas.openxmlformats.org/drawingml/2006/main" xmlns:r="http://schemas.openxmlformats.org/officeDocument/2006/relationships" xmlns:p="http://schemas.openxmlformats.org/presentationml/2006/main" show="0">
   <p:cSld>
     <p:spTree>
       <p:nvGrpSpPr>
@@ -13006,6 +12902,14 @@
   <p:clrMapOvr>
     <a:masterClrMapping/>
   </p:clrMapOvr>
+  <mc:AlternateContent xmlns:mc="http://schemas.openxmlformats.org/markup-compatibility/2006">
+    <mc:Choice xmlns:p14="http://schemas.microsoft.com/office/powerpoint/2010/main" Requires="p14">
+      <p:transition spd="slow" p14:dur="2000"/>
+    </mc:Choice>
+    <mc:Fallback>
+      <p:transition spd="slow"/>
+    </mc:Fallback>
+  </mc:AlternateContent>
   <p:timing>
     <p:tnLst>
       <p:par>

</xml_diff>